<commit_message>
Update & Add new ppts March 6 2021
</commit_message>
<xml_diff>
--- a/奇異恩典.pptx
+++ b/奇異恩典.pptx
@@ -5,10 +5,15 @@
     <p:sldMasterId id="2147483696" r:id="rId1"/>
   </p:sldMasterIdLst>
   <p:sldIdLst>
-    <p:sldId id="256" r:id="rId2"/>
-    <p:sldId id="257" r:id="rId3"/>
-    <p:sldId id="258" r:id="rId4"/>
-    <p:sldId id="259" r:id="rId5"/>
+    <p:sldId id="260" r:id="rId2"/>
+    <p:sldId id="261" r:id="rId3"/>
+    <p:sldId id="262" r:id="rId4"/>
+    <p:sldId id="263" r:id="rId5"/>
+    <p:sldId id="264" r:id="rId6"/>
+    <p:sldId id="265" r:id="rId7"/>
+    <p:sldId id="266" r:id="rId8"/>
+    <p:sldId id="267" r:id="rId9"/>
+    <p:sldId id="268" r:id="rId10"/>
   </p:sldIdLst>
   <p:sldSz cx="9144000" cy="5143500" type="screen16x9"/>
   <p:notesSz cx="6858000" cy="9144000"/>
@@ -107,6 +112,22 @@
       </a:defRPr>
     </a:lvl9pPr>
   </p:defaultTextStyle>
+  <p:extLst>
+    <p:ext uri="{EFAFB233-063F-42B5-8137-9DF3F51BA10A}">
+      <p15:sldGuideLst xmlns:p15="http://schemas.microsoft.com/office/powerpoint/2012/main">
+        <p15:guide id="1" orient="horz" pos="1620">
+          <p15:clr>
+            <a:srgbClr val="A4A3A4"/>
+          </p15:clr>
+        </p15:guide>
+        <p15:guide id="2" pos="2880">
+          <p15:clr>
+            <a:srgbClr val="A4A3A4"/>
+          </p15:clr>
+        </p15:guide>
+      </p15:sldGuideLst>
+    </p:ext>
+  </p:extLst>
 </p:presentation>
 </file>
 
@@ -292,7 +313,7 @@
             <a:fld id="{0FD5B739-B0DF-4258-9417-9953616ACB18}" type="datetimeFigureOut">
               <a:rPr lang="zh-TW" altLang="en-US" smtClean="0"/>
               <a:pPr/>
-              <a:t>2019/7/20</a:t>
+              <a:t>2021/3/6</a:t>
             </a:fld>
             <a:endParaRPr lang="zh-TW" altLang="en-US"/>
           </a:p>
@@ -459,7 +480,7 @@
             <a:fld id="{0FD5B739-B0DF-4258-9417-9953616ACB18}" type="datetimeFigureOut">
               <a:rPr lang="zh-TW" altLang="en-US" smtClean="0"/>
               <a:pPr/>
-              <a:t>2019/7/20</a:t>
+              <a:t>2021/3/6</a:t>
             </a:fld>
             <a:endParaRPr lang="zh-TW" altLang="en-US"/>
           </a:p>
@@ -636,7 +657,7 @@
             <a:fld id="{0FD5B739-B0DF-4258-9417-9953616ACB18}" type="datetimeFigureOut">
               <a:rPr lang="zh-TW" altLang="en-US" smtClean="0"/>
               <a:pPr/>
-              <a:t>2019/7/20</a:t>
+              <a:t>2021/3/6</a:t>
             </a:fld>
             <a:endParaRPr lang="zh-TW" altLang="en-US"/>
           </a:p>
@@ -803,7 +824,7 @@
             <a:fld id="{0FD5B739-B0DF-4258-9417-9953616ACB18}" type="datetimeFigureOut">
               <a:rPr lang="zh-TW" altLang="en-US" smtClean="0"/>
               <a:pPr/>
-              <a:t>2019/7/20</a:t>
+              <a:t>2021/3/6</a:t>
             </a:fld>
             <a:endParaRPr lang="zh-TW" altLang="en-US"/>
           </a:p>
@@ -1046,7 +1067,7 @@
             <a:fld id="{0FD5B739-B0DF-4258-9417-9953616ACB18}" type="datetimeFigureOut">
               <a:rPr lang="zh-TW" altLang="en-US" smtClean="0"/>
               <a:pPr/>
-              <a:t>2019/7/20</a:t>
+              <a:t>2021/3/6</a:t>
             </a:fld>
             <a:endParaRPr lang="zh-TW" altLang="en-US"/>
           </a:p>
@@ -1331,7 +1352,7 @@
             <a:fld id="{0FD5B739-B0DF-4258-9417-9953616ACB18}" type="datetimeFigureOut">
               <a:rPr lang="zh-TW" altLang="en-US" smtClean="0"/>
               <a:pPr/>
-              <a:t>2019/7/20</a:t>
+              <a:t>2021/3/6</a:t>
             </a:fld>
             <a:endParaRPr lang="zh-TW" altLang="en-US"/>
           </a:p>
@@ -1750,7 +1771,7 @@
             <a:fld id="{0FD5B739-B0DF-4258-9417-9953616ACB18}" type="datetimeFigureOut">
               <a:rPr lang="zh-TW" altLang="en-US" smtClean="0"/>
               <a:pPr/>
-              <a:t>2019/7/20</a:t>
+              <a:t>2021/3/6</a:t>
             </a:fld>
             <a:endParaRPr lang="zh-TW" altLang="en-US"/>
           </a:p>
@@ -1865,7 +1886,7 @@
             <a:fld id="{0FD5B739-B0DF-4258-9417-9953616ACB18}" type="datetimeFigureOut">
               <a:rPr lang="zh-TW" altLang="en-US" smtClean="0"/>
               <a:pPr/>
-              <a:t>2019/7/20</a:t>
+              <a:t>2021/3/6</a:t>
             </a:fld>
             <a:endParaRPr lang="zh-TW" altLang="en-US"/>
           </a:p>
@@ -1957,7 +1978,7 @@
             <a:fld id="{0FD5B739-B0DF-4258-9417-9953616ACB18}" type="datetimeFigureOut">
               <a:rPr lang="zh-TW" altLang="en-US" smtClean="0"/>
               <a:pPr/>
-              <a:t>2019/7/20</a:t>
+              <a:t>2021/3/6</a:t>
             </a:fld>
             <a:endParaRPr lang="zh-TW" altLang="en-US"/>
           </a:p>
@@ -2231,7 +2252,7 @@
             <a:fld id="{0FD5B739-B0DF-4258-9417-9953616ACB18}" type="datetimeFigureOut">
               <a:rPr lang="zh-TW" altLang="en-US" smtClean="0"/>
               <a:pPr/>
-              <a:t>2019/7/20</a:t>
+              <a:t>2021/3/6</a:t>
             </a:fld>
             <a:endParaRPr lang="zh-TW" altLang="en-US"/>
           </a:p>
@@ -2485,7 +2506,7 @@
             <a:fld id="{0FD5B739-B0DF-4258-9417-9953616ACB18}" type="datetimeFigureOut">
               <a:rPr lang="zh-TW" altLang="en-US" smtClean="0"/>
               <a:pPr/>
-              <a:t>2019/7/20</a:t>
+              <a:t>2021/3/6</a:t>
             </a:fld>
             <a:endParaRPr lang="zh-TW" altLang="en-US"/>
           </a:p>
@@ -2700,7 +2721,7 @@
             <a:fld id="{0FD5B739-B0DF-4258-9417-9953616ACB18}" type="datetimeFigureOut">
               <a:rPr lang="zh-TW" altLang="en-US" smtClean="0"/>
               <a:pPr/>
-              <a:t>2019/7/20</a:t>
+              <a:t>2021/3/6</a:t>
             </a:fld>
             <a:endParaRPr lang="zh-TW" altLang="en-US"/>
           </a:p>
@@ -3081,152 +3102,61 @@
             <p:ph type="title"/>
           </p:nvPr>
         </p:nvSpPr>
-        <p:spPr/>
+        <p:spPr>
+          <a:xfrm>
+            <a:off x="0" y="2143135"/>
+            <a:ext cx="9144000" cy="857250"/>
+          </a:xfrm>
+        </p:spPr>
         <p:txBody>
           <a:bodyPr>
-            <a:normAutofit/>
+            <a:noAutofit/>
           </a:bodyPr>
           <a:lstStyle/>
           <a:p>
             <a:r>
-              <a:rPr lang="zh-TW" altLang="en-US" sz="4000" b="1" dirty="0" smtClean="0">
+              <a:rPr lang="zh-TW" altLang="en-US" sz="5400" b="1" i="1" dirty="0" smtClean="0">
                 <a:solidFill>
                   <a:srgbClr val="000066"/>
                 </a:solidFill>
+                <a:effectLst>
+                  <a:outerShdw blurRad="38100" dist="38100" dir="2700000" algn="tl">
+                    <a:srgbClr val="000000">
+                      <a:alpha val="43137"/>
+                    </a:srgbClr>
+                  </a:outerShdw>
+                </a:effectLst>
                 <a:latin typeface="微軟正黑體" pitchFamily="34" charset="-120"/>
                 <a:ea typeface="微軟正黑體" pitchFamily="34" charset="-120"/>
               </a:rPr>
-              <a:t>奇異恩典</a:t>
-            </a:r>
-            <a:endParaRPr lang="zh-TW" altLang="en-US" sz="4000" b="1" dirty="0">
-              <a:solidFill>
-                <a:srgbClr val="000066"/>
-              </a:solidFill>
-              <a:latin typeface="微軟正黑體" pitchFamily="34" charset="-120"/>
-              <a:ea typeface="微軟正黑體" pitchFamily="34" charset="-120"/>
-            </a:endParaRPr>
-          </a:p>
-        </p:txBody>
-      </p:sp>
-      <p:sp>
-        <p:nvSpPr>
-          <p:cNvPr id="5" name="內容版面配置區 4"/>
-          <p:cNvSpPr>
-            <a:spLocks noGrp="1"/>
-          </p:cNvSpPr>
-          <p:nvPr>
-            <p:ph idx="1"/>
-          </p:nvPr>
-        </p:nvSpPr>
-        <p:spPr/>
-        <p:txBody>
-          <a:bodyPr>
-            <a:noAutofit/>
-          </a:bodyPr>
-          <a:lstStyle/>
-          <a:p>
-            <a:pPr algn="ctr">
-              <a:buNone/>
-            </a:pPr>
-            <a:r>
-              <a:rPr lang="zh-TW" altLang="en-US" sz="4800" b="1" dirty="0">
+              <a:t>奇</a:t>
+            </a:r>
+            <a:r>
+              <a:rPr lang="zh-TW" altLang="en-US" sz="5400" b="1" i="1" dirty="0">
                 <a:solidFill>
                   <a:srgbClr val="000066"/>
                 </a:solidFill>
+                <a:effectLst>
+                  <a:outerShdw blurRad="38100" dist="38100" dir="2700000" algn="tl">
+                    <a:srgbClr val="000000">
+                      <a:alpha val="43137"/>
+                    </a:srgbClr>
+                  </a:outerShdw>
+                </a:effectLst>
                 <a:latin typeface="微軟正黑體" pitchFamily="34" charset="-120"/>
                 <a:ea typeface="微軟正黑體" pitchFamily="34" charset="-120"/>
               </a:rPr>
-              <a:t>奇異</a:t>
-            </a:r>
-            <a:r>
-              <a:rPr lang="zh-TW" altLang="en-US" sz="4800" b="1" dirty="0" smtClean="0">
-                <a:solidFill>
-                  <a:srgbClr val="000066"/>
-                </a:solidFill>
-                <a:latin typeface="微軟正黑體" pitchFamily="34" charset="-120"/>
-                <a:ea typeface="微軟正黑體" pitchFamily="34" charset="-120"/>
-              </a:rPr>
-              <a:t>恩典  何等</a:t>
-            </a:r>
-            <a:r>
-              <a:rPr lang="zh-TW" altLang="en-US" sz="4800" b="1" dirty="0">
-                <a:solidFill>
-                  <a:srgbClr val="000066"/>
-                </a:solidFill>
-                <a:latin typeface="微軟正黑體" pitchFamily="34" charset="-120"/>
-                <a:ea typeface="微軟正黑體" pitchFamily="34" charset="-120"/>
-              </a:rPr>
-              <a:t>甘甜</a:t>
-            </a:r>
-          </a:p>
-          <a:p>
-            <a:pPr algn="ctr">
-              <a:buNone/>
-            </a:pPr>
-            <a:r>
-              <a:rPr lang="zh-TW" altLang="en-US" sz="4800" b="1" dirty="0">
-                <a:solidFill>
-                  <a:srgbClr val="000066"/>
-                </a:solidFill>
-                <a:latin typeface="微軟正黑體" pitchFamily="34" charset="-120"/>
-                <a:ea typeface="微軟正黑體" pitchFamily="34" charset="-120"/>
-              </a:rPr>
-              <a:t>我罪已得赦免</a:t>
-            </a:r>
-          </a:p>
-          <a:p>
-            <a:pPr algn="ctr">
-              <a:buNone/>
-            </a:pPr>
-            <a:r>
-              <a:rPr lang="zh-TW" altLang="en-US" sz="4800" b="1" dirty="0">
-                <a:solidFill>
-                  <a:srgbClr val="000066"/>
-                </a:solidFill>
-                <a:latin typeface="微軟正黑體" pitchFamily="34" charset="-120"/>
-                <a:ea typeface="微軟正黑體" pitchFamily="34" charset="-120"/>
-              </a:rPr>
-              <a:t>前我失喪 </a:t>
-            </a:r>
-            <a:r>
-              <a:rPr lang="zh-TW" altLang="en-US" sz="4800" b="1" dirty="0" smtClean="0">
-                <a:solidFill>
-                  <a:srgbClr val="000066"/>
-                </a:solidFill>
-                <a:latin typeface="微軟正黑體" pitchFamily="34" charset="-120"/>
-                <a:ea typeface="微軟正黑體" pitchFamily="34" charset="-120"/>
-              </a:rPr>
-              <a:t> 今</a:t>
-            </a:r>
-            <a:r>
-              <a:rPr lang="zh-TW" altLang="en-US" sz="4800" b="1" dirty="0">
-                <a:solidFill>
-                  <a:srgbClr val="000066"/>
-                </a:solidFill>
-                <a:latin typeface="微軟正黑體" pitchFamily="34" charset="-120"/>
-                <a:ea typeface="微軟正黑體" pitchFamily="34" charset="-120"/>
-              </a:rPr>
-              <a:t>被尋回</a:t>
-            </a:r>
-          </a:p>
-          <a:p>
-            <a:pPr algn="ctr">
-              <a:buNone/>
-            </a:pPr>
-            <a:r>
-              <a:rPr lang="zh-TW" altLang="en-US" sz="4800" b="1" dirty="0">
-                <a:solidFill>
-                  <a:srgbClr val="000066"/>
-                </a:solidFill>
-                <a:latin typeface="微軟正黑體" pitchFamily="34" charset="-120"/>
-                <a:ea typeface="微軟正黑體" pitchFamily="34" charset="-120"/>
-              </a:rPr>
-              <a:t>瞎眼今得看見</a:t>
+              <a:t>異恩典</a:t>
             </a:r>
           </a:p>
         </p:txBody>
       </p:sp>
     </p:spTree>
+    <p:extLst>
+      <p:ext uri="{BB962C8B-B14F-4D97-AF65-F5344CB8AC3E}">
+        <p14:creationId xmlns:p14="http://schemas.microsoft.com/office/powerpoint/2010/main" val="1016112415"/>
+      </p:ext>
+    </p:extLst>
   </p:cSld>
   <p:clrMapOvr>
     <a:masterClrMapping/>
@@ -3253,32 +3183,55 @@
       </p:grpSpPr>
       <p:sp>
         <p:nvSpPr>
-          <p:cNvPr id="4" name="標題 3"/>
-          <p:cNvSpPr>
-            <a:spLocks noGrp="1"/>
-          </p:cNvSpPr>
-          <p:nvPr>
-            <p:ph type="title"/>
-          </p:nvPr>
-        </p:nvSpPr>
-        <p:spPr/>
-        <p:txBody>
-          <a:bodyPr>
+          <p:cNvPr id="5" name="內容版面配置區 4"/>
+          <p:cNvSpPr>
+            <a:spLocks noGrp="1"/>
+          </p:cNvSpPr>
+          <p:nvPr>
+            <p:ph idx="1"/>
+          </p:nvPr>
+        </p:nvSpPr>
+        <p:spPr>
+          <a:xfrm>
+            <a:off x="0" y="1563638"/>
+            <a:ext cx="9144000" cy="1803647"/>
+          </a:xfrm>
+        </p:spPr>
+        <p:txBody>
+          <a:bodyPr anchor="ctr">
             <a:normAutofit/>
           </a:bodyPr>
           <a:lstStyle/>
           <a:p>
-            <a:r>
-              <a:rPr lang="zh-TW" altLang="en-US" sz="4000" b="1" dirty="0">
+            <a:pPr algn="ctr">
+              <a:buNone/>
+            </a:pPr>
+            <a:r>
+              <a:rPr lang="zh-TW" altLang="en-US" sz="4800" b="1" dirty="0">
                 <a:solidFill>
                   <a:srgbClr val="000066"/>
                 </a:solidFill>
                 <a:latin typeface="微軟正黑體" pitchFamily="34" charset="-120"/>
                 <a:ea typeface="微軟正黑體" pitchFamily="34" charset="-120"/>
               </a:rPr>
-              <a:t>奇異恩典</a:t>
-            </a:r>
-            <a:endParaRPr lang="zh-TW" altLang="en-US" sz="4000" b="1" dirty="0">
+              <a:t>奇異恩典  何等甘甜</a:t>
+            </a:r>
+          </a:p>
+          <a:p>
+            <a:pPr algn="ctr">
+              <a:buNone/>
+            </a:pPr>
+            <a:r>
+              <a:rPr lang="zh-TW" altLang="en-US" sz="4800" b="1" dirty="0">
+                <a:solidFill>
+                  <a:srgbClr val="000066"/>
+                </a:solidFill>
+                <a:latin typeface="微軟正黑體" pitchFamily="34" charset="-120"/>
+                <a:ea typeface="微軟正黑體" pitchFamily="34" charset="-120"/>
+              </a:rPr>
+              <a:t>我罪已得赦免</a:t>
+            </a:r>
+            <a:endParaRPr lang="zh-TW" altLang="en-US" sz="4800" b="1" dirty="0">
               <a:solidFill>
                 <a:srgbClr val="000066"/>
               </a:solidFill>
@@ -3290,123 +3243,49 @@
       </p:sp>
       <p:sp>
         <p:nvSpPr>
-          <p:cNvPr id="5" name="內容版面配置區 4"/>
-          <p:cNvSpPr>
-            <a:spLocks noGrp="1"/>
-          </p:cNvSpPr>
-          <p:nvPr>
-            <p:ph idx="1"/>
-          </p:nvPr>
-        </p:nvSpPr>
-        <p:spPr/>
-        <p:txBody>
-          <a:bodyPr>
-            <a:noAutofit/>
+          <p:cNvPr id="3" name="TextBox 2"/>
+          <p:cNvSpPr txBox="1"/>
+          <p:nvPr/>
+        </p:nvSpPr>
+        <p:spPr>
+          <a:xfrm>
+            <a:off x="0" y="3939903"/>
+            <a:ext cx="9144000" cy="646331"/>
+          </a:xfrm>
+          <a:prstGeom prst="rect">
+            <a:avLst/>
+          </a:prstGeom>
+          <a:noFill/>
+        </p:spPr>
+        <p:txBody>
+          <a:bodyPr wrap="square" rtlCol="0">
+            <a:spAutoFit/>
           </a:bodyPr>
           <a:lstStyle/>
           <a:p>
-            <a:pPr algn="ctr">
-              <a:buNone/>
-            </a:pPr>
-            <a:r>
-              <a:rPr lang="zh-TW" altLang="en-US" sz="4800" b="1" dirty="0">
+            <a:pPr algn="ctr"/>
+            <a:r>
+              <a:rPr lang="en-US" sz="3600" b="1" dirty="0">
                 <a:solidFill>
                   <a:srgbClr val="000066"/>
                 </a:solidFill>
-                <a:latin typeface="微軟正黑體" pitchFamily="34" charset="-120"/>
-                <a:ea typeface="微軟正黑體" pitchFamily="34" charset="-120"/>
               </a:rPr>
-              <a:t>如此恩典 </a:t>
-            </a:r>
-            <a:r>
-              <a:rPr lang="zh-TW" altLang="en-US" sz="4800" b="1" dirty="0">
-                <a:solidFill>
-                  <a:srgbClr val="000066"/>
-                </a:solidFill>
-                <a:latin typeface="微軟正黑體" pitchFamily="34" charset="-120"/>
-                <a:ea typeface="微軟正黑體" pitchFamily="34" charset="-120"/>
-              </a:rPr>
-              <a:t> 使</a:t>
-            </a:r>
-            <a:r>
-              <a:rPr lang="zh-TW" altLang="en-US" sz="4800" b="1" dirty="0">
-                <a:solidFill>
-                  <a:srgbClr val="000066"/>
-                </a:solidFill>
-                <a:latin typeface="微軟正黑體" pitchFamily="34" charset="-120"/>
-                <a:ea typeface="微軟正黑體" pitchFamily="34" charset="-120"/>
-              </a:rPr>
-              <a:t>我敬畏</a:t>
-            </a:r>
-          </a:p>
-          <a:p>
-            <a:pPr algn="ctr">
-              <a:buNone/>
-            </a:pPr>
-            <a:r>
-              <a:rPr lang="zh-TW" altLang="en-US" sz="4800" b="1" dirty="0">
-                <a:solidFill>
-                  <a:srgbClr val="000066"/>
-                </a:solidFill>
-                <a:latin typeface="微軟正黑體" pitchFamily="34" charset="-120"/>
-                <a:ea typeface="微軟正黑體" pitchFamily="34" charset="-120"/>
-              </a:rPr>
-              <a:t>使我心得安慰</a:t>
-            </a:r>
-          </a:p>
-          <a:p>
-            <a:pPr algn="ctr">
-              <a:buNone/>
-            </a:pPr>
-            <a:r>
-              <a:rPr lang="zh-TW" altLang="en-US" sz="4800" b="1" dirty="0">
-                <a:solidFill>
-                  <a:srgbClr val="000066"/>
-                </a:solidFill>
-                <a:latin typeface="微軟正黑體" pitchFamily="34" charset="-120"/>
-                <a:ea typeface="微軟正黑體" pitchFamily="34" charset="-120"/>
-              </a:rPr>
-              <a:t>初信之時 </a:t>
-            </a:r>
-            <a:r>
-              <a:rPr lang="zh-TW" altLang="en-US" sz="4800" b="1" dirty="0">
-                <a:solidFill>
-                  <a:srgbClr val="000066"/>
-                </a:solidFill>
-                <a:latin typeface="微軟正黑體" pitchFamily="34" charset="-120"/>
-                <a:ea typeface="微軟正黑體" pitchFamily="34" charset="-120"/>
-              </a:rPr>
-              <a:t> 我</a:t>
-            </a:r>
-            <a:r>
-              <a:rPr lang="zh-TW" altLang="en-US" sz="4800" b="1" dirty="0">
-                <a:solidFill>
-                  <a:srgbClr val="000066"/>
-                </a:solidFill>
-                <a:latin typeface="微軟正黑體" pitchFamily="34" charset="-120"/>
-                <a:ea typeface="微軟正黑體" pitchFamily="34" charset="-120"/>
-              </a:rPr>
-              <a:t>蒙恩惠</a:t>
-            </a:r>
-          </a:p>
-          <a:p>
-            <a:pPr algn="ctr">
-              <a:buNone/>
-            </a:pPr>
-            <a:r>
-              <a:rPr lang="zh-TW" altLang="en-US" sz="4800" b="1" dirty="0">
-                <a:solidFill>
-                  <a:srgbClr val="000066"/>
-                </a:solidFill>
-                <a:latin typeface="微軟正黑體" pitchFamily="34" charset="-120"/>
-                <a:ea typeface="微軟正黑體" pitchFamily="34" charset="-120"/>
-              </a:rPr>
-              <a:t>真是何等寶貴</a:t>
-            </a:r>
+              <a:t>( 1 )</a:t>
+            </a:r>
+            <a:endParaRPr lang="vi-VN" sz="3600" b="1" dirty="0">
+              <a:solidFill>
+                <a:srgbClr val="000066"/>
+              </a:solidFill>
+            </a:endParaRPr>
           </a:p>
         </p:txBody>
       </p:sp>
     </p:spTree>
+    <p:extLst>
+      <p:ext uri="{BB962C8B-B14F-4D97-AF65-F5344CB8AC3E}">
+        <p14:creationId xmlns:p14="http://schemas.microsoft.com/office/powerpoint/2010/main" val="2070592081"/>
+      </p:ext>
+    </p:extLst>
   </p:cSld>
   <p:clrMapOvr>
     <a:masterClrMapping/>
@@ -3433,57 +3312,40 @@
       </p:grpSpPr>
       <p:sp>
         <p:nvSpPr>
-          <p:cNvPr id="4" name="標題 3"/>
-          <p:cNvSpPr>
-            <a:spLocks noGrp="1"/>
-          </p:cNvSpPr>
-          <p:nvPr>
-            <p:ph type="title"/>
-          </p:nvPr>
-        </p:nvSpPr>
-        <p:spPr/>
-        <p:txBody>
-          <a:bodyPr>
+          <p:cNvPr id="5" name="內容版面配置區 4"/>
+          <p:cNvSpPr>
+            <a:spLocks noGrp="1"/>
+          </p:cNvSpPr>
+          <p:nvPr>
+            <p:ph idx="1"/>
+          </p:nvPr>
+        </p:nvSpPr>
+        <p:spPr>
+          <a:xfrm>
+            <a:off x="0" y="1563638"/>
+            <a:ext cx="9144000" cy="1803647"/>
+          </a:xfrm>
+        </p:spPr>
+        <p:txBody>
+          <a:bodyPr anchor="ctr">
             <a:normAutofit/>
           </a:bodyPr>
           <a:lstStyle/>
           <a:p>
-            <a:r>
-              <a:rPr lang="zh-TW" altLang="en-US" sz="4000" b="1" dirty="0">
+            <a:pPr algn="ctr">
+              <a:buNone/>
+            </a:pPr>
+            <a:r>
+              <a:rPr lang="zh-TW" altLang="en-US" sz="4800" b="1" dirty="0">
                 <a:solidFill>
                   <a:srgbClr val="000066"/>
                 </a:solidFill>
                 <a:latin typeface="微軟正黑體" pitchFamily="34" charset="-120"/>
                 <a:ea typeface="微軟正黑體" pitchFamily="34" charset="-120"/>
               </a:rPr>
-              <a:t>奇異恩典</a:t>
-            </a:r>
-            <a:endParaRPr lang="zh-TW" altLang="en-US" sz="4000" b="1" dirty="0">
-              <a:solidFill>
-                <a:srgbClr val="000066"/>
-              </a:solidFill>
-              <a:latin typeface="微軟正黑體" pitchFamily="34" charset="-120"/>
-              <a:ea typeface="微軟正黑體" pitchFamily="34" charset="-120"/>
-            </a:endParaRPr>
-          </a:p>
-        </p:txBody>
-      </p:sp>
-      <p:sp>
-        <p:nvSpPr>
-          <p:cNvPr id="5" name="內容版面配置區 4"/>
-          <p:cNvSpPr>
-            <a:spLocks noGrp="1"/>
-          </p:cNvSpPr>
-          <p:nvPr>
-            <p:ph idx="1"/>
-          </p:nvPr>
-        </p:nvSpPr>
-        <p:spPr/>
-        <p:txBody>
-          <a:bodyPr>
-            <a:noAutofit/>
-          </a:bodyPr>
-          <a:lstStyle/>
+              <a:t>前我失喪  今被尋回</a:t>
+            </a:r>
+          </a:p>
           <a:p>
             <a:pPr algn="ctr">
               <a:buNone/>
@@ -3496,52 +3358,7 @@
                 <a:latin typeface="微軟正黑體" pitchFamily="34" charset="-120"/>
                 <a:ea typeface="微軟正黑體" pitchFamily="34" charset="-120"/>
               </a:rPr>
-              <a:t>如此</a:t>
-            </a:r>
-            <a:r>
-              <a:rPr lang="zh-TW" altLang="en-US" sz="4800" b="1" dirty="0">
-                <a:solidFill>
-                  <a:srgbClr val="000066"/>
-                </a:solidFill>
-                <a:latin typeface="微軟正黑體" pitchFamily="34" charset="-120"/>
-                <a:ea typeface="微軟正黑體" pitchFamily="34" charset="-120"/>
-              </a:rPr>
-              <a:t>危險  試</a:t>
-            </a:r>
-            <a:r>
-              <a:rPr lang="zh-TW" altLang="en-US" sz="4800" b="1" dirty="0">
-                <a:solidFill>
-                  <a:srgbClr val="000066"/>
-                </a:solidFill>
-                <a:latin typeface="微軟正黑體" pitchFamily="34" charset="-120"/>
-                <a:ea typeface="微軟正黑體" pitchFamily="34" charset="-120"/>
-              </a:rPr>
-              <a:t>煉網羅</a:t>
-            </a:r>
-          </a:p>
-          <a:p>
-            <a:pPr algn="ctr">
-              <a:buNone/>
-            </a:pPr>
-            <a:r>
-              <a:rPr lang="zh-TW" altLang="en-US" sz="4800" b="1" dirty="0">
-                <a:solidFill>
-                  <a:srgbClr val="000066"/>
-                </a:solidFill>
-                <a:latin typeface="微軟正黑體" pitchFamily="34" charset="-120"/>
-                <a:ea typeface="微軟正黑體" pitchFamily="34" charset="-120"/>
-              </a:rPr>
-              <a:t>我已安然</a:t>
-            </a:r>
-            <a:r>
-              <a:rPr lang="zh-TW" altLang="en-US" sz="4800" b="1" dirty="0">
-                <a:solidFill>
-                  <a:srgbClr val="000066"/>
-                </a:solidFill>
-                <a:latin typeface="微軟正黑體" pitchFamily="34" charset="-120"/>
-                <a:ea typeface="微軟正黑體" pitchFamily="34" charset="-120"/>
-              </a:rPr>
-              <a:t>經過</a:t>
+              <a:t>瞎眼今得看見</a:t>
             </a:r>
             <a:endParaRPr lang="zh-TW" altLang="en-US" sz="4800" b="1" dirty="0">
               <a:solidFill>
@@ -3551,59 +3368,53 @@
               <a:ea typeface="微軟正黑體" pitchFamily="34" charset="-120"/>
             </a:endParaRPr>
           </a:p>
-          <a:p>
-            <a:pPr algn="ctr">
-              <a:buNone/>
-            </a:pPr>
-            <a:r>
-              <a:rPr lang="zh-TW" altLang="en-US" sz="4800" b="1" dirty="0">
+        </p:txBody>
+      </p:sp>
+      <p:sp>
+        <p:nvSpPr>
+          <p:cNvPr id="3" name="TextBox 2"/>
+          <p:cNvSpPr txBox="1"/>
+          <p:nvPr/>
+        </p:nvSpPr>
+        <p:spPr>
+          <a:xfrm>
+            <a:off x="0" y="3939903"/>
+            <a:ext cx="9144000" cy="646331"/>
+          </a:xfrm>
+          <a:prstGeom prst="rect">
+            <a:avLst/>
+          </a:prstGeom>
+          <a:noFill/>
+        </p:spPr>
+        <p:txBody>
+          <a:bodyPr wrap="square" rtlCol="0">
+            <a:spAutoFit/>
+          </a:bodyPr>
+          <a:lstStyle/>
+          <a:p>
+            <a:pPr algn="ctr"/>
+            <a:r>
+              <a:rPr lang="en-US" sz="3600" b="1" dirty="0">
                 <a:solidFill>
                   <a:srgbClr val="000066"/>
                 </a:solidFill>
-                <a:latin typeface="微軟正黑體" pitchFamily="34" charset="-120"/>
-                <a:ea typeface="微軟正黑體" pitchFamily="34" charset="-120"/>
               </a:rPr>
-              <a:t>靠主恩典 </a:t>
-            </a:r>
-            <a:r>
-              <a:rPr lang="zh-TW" altLang="en-US" sz="4800" b="1" dirty="0">
-                <a:solidFill>
-                  <a:srgbClr val="000066"/>
-                </a:solidFill>
-                <a:latin typeface="微軟正黑體" pitchFamily="34" charset="-120"/>
-                <a:ea typeface="微軟正黑體" pitchFamily="34" charset="-120"/>
-              </a:rPr>
-              <a:t> 安全</a:t>
-            </a:r>
-            <a:r>
-              <a:rPr lang="zh-TW" altLang="en-US" sz="4800" b="1" dirty="0">
-                <a:solidFill>
-                  <a:srgbClr val="000066"/>
-                </a:solidFill>
-                <a:latin typeface="微軟正黑體" pitchFamily="34" charset="-120"/>
-                <a:ea typeface="微軟正黑體" pitchFamily="34" charset="-120"/>
-              </a:rPr>
-              <a:t>不怕</a:t>
-            </a:r>
-          </a:p>
-          <a:p>
-            <a:pPr algn="ctr">
-              <a:buNone/>
-            </a:pPr>
-            <a:r>
-              <a:rPr lang="zh-TW" altLang="en-US" sz="4800" b="1" dirty="0">
-                <a:solidFill>
-                  <a:srgbClr val="000066"/>
-                </a:solidFill>
-                <a:latin typeface="微軟正黑體" pitchFamily="34" charset="-120"/>
-                <a:ea typeface="微軟正黑體" pitchFamily="34" charset="-120"/>
-              </a:rPr>
-              <a:t>更引導我歸家</a:t>
-            </a:r>
+              <a:t>( 1 )</a:t>
+            </a:r>
+            <a:endParaRPr lang="vi-VN" sz="3600" b="1" dirty="0">
+              <a:solidFill>
+                <a:srgbClr val="000066"/>
+              </a:solidFill>
+            </a:endParaRPr>
           </a:p>
         </p:txBody>
       </p:sp>
     </p:spTree>
+    <p:extLst>
+      <p:ext uri="{BB962C8B-B14F-4D97-AF65-F5344CB8AC3E}">
+        <p14:creationId xmlns:p14="http://schemas.microsoft.com/office/powerpoint/2010/main" val="2142411284"/>
+      </p:ext>
+    </p:extLst>
   </p:cSld>
   <p:clrMapOvr>
     <a:masterClrMapping/>
@@ -3630,32 +3441,55 @@
       </p:grpSpPr>
       <p:sp>
         <p:nvSpPr>
-          <p:cNvPr id="4" name="標題 3"/>
-          <p:cNvSpPr>
-            <a:spLocks noGrp="1"/>
-          </p:cNvSpPr>
-          <p:nvPr>
-            <p:ph type="title"/>
-          </p:nvPr>
-        </p:nvSpPr>
-        <p:spPr/>
-        <p:txBody>
-          <a:bodyPr>
+          <p:cNvPr id="5" name="內容版面配置區 4"/>
+          <p:cNvSpPr>
+            <a:spLocks noGrp="1"/>
+          </p:cNvSpPr>
+          <p:nvPr>
+            <p:ph idx="1"/>
+          </p:nvPr>
+        </p:nvSpPr>
+        <p:spPr>
+          <a:xfrm>
+            <a:off x="0" y="1563638"/>
+            <a:ext cx="9144000" cy="1803647"/>
+          </a:xfrm>
+        </p:spPr>
+        <p:txBody>
+          <a:bodyPr anchor="ctr">
             <a:normAutofit/>
           </a:bodyPr>
           <a:lstStyle/>
           <a:p>
-            <a:r>
-              <a:rPr lang="zh-TW" altLang="en-US" sz="4000" b="1" dirty="0">
+            <a:pPr algn="ctr">
+              <a:buNone/>
+            </a:pPr>
+            <a:r>
+              <a:rPr lang="zh-TW" altLang="en-US" sz="4800" b="1" dirty="0">
                 <a:solidFill>
                   <a:srgbClr val="000066"/>
                 </a:solidFill>
                 <a:latin typeface="微軟正黑體" pitchFamily="34" charset="-120"/>
                 <a:ea typeface="微軟正黑體" pitchFamily="34" charset="-120"/>
               </a:rPr>
-              <a:t>奇異恩典</a:t>
-            </a:r>
-            <a:endParaRPr lang="zh-TW" altLang="en-US" sz="4000" b="1" dirty="0">
+              <a:t>如此恩典  使我敬畏</a:t>
+            </a:r>
+          </a:p>
+          <a:p>
+            <a:pPr algn="ctr">
+              <a:buNone/>
+            </a:pPr>
+            <a:r>
+              <a:rPr lang="zh-TW" altLang="en-US" sz="4800" b="1" dirty="0">
+                <a:solidFill>
+                  <a:srgbClr val="000066"/>
+                </a:solidFill>
+                <a:latin typeface="微軟正黑體" pitchFamily="34" charset="-120"/>
+                <a:ea typeface="微軟正黑體" pitchFamily="34" charset="-120"/>
+              </a:rPr>
+              <a:t>使我心得安慰</a:t>
+            </a:r>
+            <a:endParaRPr lang="zh-TW" altLang="en-US" sz="4800" b="1" dirty="0">
               <a:solidFill>
                 <a:srgbClr val="000066"/>
               </a:solidFill>
@@ -3667,6 +3501,91 @@
       </p:sp>
       <p:sp>
         <p:nvSpPr>
+          <p:cNvPr id="3" name="TextBox 2"/>
+          <p:cNvSpPr txBox="1"/>
+          <p:nvPr/>
+        </p:nvSpPr>
+        <p:spPr>
+          <a:xfrm>
+            <a:off x="0" y="3939903"/>
+            <a:ext cx="9144000" cy="646331"/>
+          </a:xfrm>
+          <a:prstGeom prst="rect">
+            <a:avLst/>
+          </a:prstGeom>
+          <a:noFill/>
+        </p:spPr>
+        <p:txBody>
+          <a:bodyPr wrap="square" rtlCol="0">
+            <a:spAutoFit/>
+          </a:bodyPr>
+          <a:lstStyle/>
+          <a:p>
+            <a:pPr algn="ctr"/>
+            <a:r>
+              <a:rPr lang="en-US" sz="3600" b="1" dirty="0">
+                <a:solidFill>
+                  <a:srgbClr val="000066"/>
+                </a:solidFill>
+              </a:rPr>
+              <a:t>( </a:t>
+            </a:r>
+            <a:r>
+              <a:rPr lang="en-US" sz="3600" b="1" dirty="0" smtClean="0">
+                <a:solidFill>
+                  <a:srgbClr val="000066"/>
+                </a:solidFill>
+              </a:rPr>
+              <a:t>2 </a:t>
+            </a:r>
+            <a:r>
+              <a:rPr lang="en-US" sz="3600" b="1" dirty="0">
+                <a:solidFill>
+                  <a:srgbClr val="000066"/>
+                </a:solidFill>
+              </a:rPr>
+              <a:t>)</a:t>
+            </a:r>
+            <a:endParaRPr lang="vi-VN" sz="3600" b="1" dirty="0">
+              <a:solidFill>
+                <a:srgbClr val="000066"/>
+              </a:solidFill>
+            </a:endParaRPr>
+          </a:p>
+        </p:txBody>
+      </p:sp>
+    </p:spTree>
+    <p:extLst>
+      <p:ext uri="{BB962C8B-B14F-4D97-AF65-F5344CB8AC3E}">
+        <p14:creationId xmlns:p14="http://schemas.microsoft.com/office/powerpoint/2010/main" val="3215772752"/>
+      </p:ext>
+    </p:extLst>
+  </p:cSld>
+  <p:clrMapOvr>
+    <a:masterClrMapping/>
+  </p:clrMapOvr>
+</p:sld>
+</file>
+
+<file path=ppt/slides/slide5.xml><?xml version="1.0" encoding="utf-8"?>
+<p:sld xmlns:a="http://schemas.openxmlformats.org/drawingml/2006/main" xmlns:r="http://schemas.openxmlformats.org/officeDocument/2006/relationships" xmlns:p="http://schemas.openxmlformats.org/presentationml/2006/main">
+  <p:cSld>
+    <p:spTree>
+      <p:nvGrpSpPr>
+        <p:cNvPr id="1" name=""/>
+        <p:cNvGrpSpPr/>
+        <p:nvPr/>
+      </p:nvGrpSpPr>
+      <p:grpSpPr>
+        <a:xfrm>
+          <a:off x="0" y="0"/>
+          <a:ext cx="0" cy="0"/>
+          <a:chOff x="0" y="0"/>
+          <a:chExt cx="0" cy="0"/>
+        </a:xfrm>
+      </p:grpSpPr>
+      <p:sp>
+        <p:nvSpPr>
           <p:cNvPr id="5" name="內容版面配置區 4"/>
           <p:cNvSpPr>
             <a:spLocks noGrp="1"/>
@@ -3675,10 +3594,15 @@
             <p:ph idx="1"/>
           </p:nvPr>
         </p:nvSpPr>
-        <p:spPr/>
-        <p:txBody>
-          <a:bodyPr>
-            <a:noAutofit/>
+        <p:spPr>
+          <a:xfrm>
+            <a:off x="0" y="1563638"/>
+            <a:ext cx="9144000" cy="1803647"/>
+          </a:xfrm>
+        </p:spPr>
+        <p:txBody>
+          <a:bodyPr anchor="ctr">
+            <a:normAutofit/>
           </a:bodyPr>
           <a:lstStyle/>
           <a:p>
@@ -3693,8 +3617,13 @@
                 <a:latin typeface="微軟正黑體" pitchFamily="34" charset="-120"/>
                 <a:ea typeface="微軟正黑體" pitchFamily="34" charset="-120"/>
               </a:rPr>
-              <a:t>將來禧年 </a:t>
-            </a:r>
+              <a:t>初信之時  我蒙恩惠</a:t>
+            </a:r>
+          </a:p>
+          <a:p>
+            <a:pPr algn="ctr">
+              <a:buNone/>
+            </a:pPr>
             <a:r>
               <a:rPr lang="zh-TW" altLang="en-US" sz="4800" b="1" dirty="0">
                 <a:solidFill>
@@ -3703,8 +3632,128 @@
                 <a:latin typeface="微軟正黑體" pitchFamily="34" charset="-120"/>
                 <a:ea typeface="微軟正黑體" pitchFamily="34" charset="-120"/>
               </a:rPr>
-              <a:t> 聖</a:t>
-            </a:r>
+              <a:t>真是何等寶貴</a:t>
+            </a:r>
+            <a:endParaRPr lang="zh-TW" altLang="en-US" sz="4800" b="1" dirty="0">
+              <a:solidFill>
+                <a:srgbClr val="000066"/>
+              </a:solidFill>
+              <a:latin typeface="微軟正黑體" pitchFamily="34" charset="-120"/>
+              <a:ea typeface="微軟正黑體" pitchFamily="34" charset="-120"/>
+            </a:endParaRPr>
+          </a:p>
+        </p:txBody>
+      </p:sp>
+      <p:sp>
+        <p:nvSpPr>
+          <p:cNvPr id="3" name="TextBox 2"/>
+          <p:cNvSpPr txBox="1"/>
+          <p:nvPr/>
+        </p:nvSpPr>
+        <p:spPr>
+          <a:xfrm>
+            <a:off x="0" y="3939903"/>
+            <a:ext cx="9144000" cy="646331"/>
+          </a:xfrm>
+          <a:prstGeom prst="rect">
+            <a:avLst/>
+          </a:prstGeom>
+          <a:noFill/>
+        </p:spPr>
+        <p:txBody>
+          <a:bodyPr wrap="square" rtlCol="0">
+            <a:spAutoFit/>
+          </a:bodyPr>
+          <a:lstStyle/>
+          <a:p>
+            <a:pPr algn="ctr"/>
+            <a:r>
+              <a:rPr lang="en-US" sz="3600" b="1" dirty="0">
+                <a:solidFill>
+                  <a:srgbClr val="000066"/>
+                </a:solidFill>
+              </a:rPr>
+              <a:t>( </a:t>
+            </a:r>
+            <a:r>
+              <a:rPr lang="en-US" sz="3600" b="1" dirty="0" smtClean="0">
+                <a:solidFill>
+                  <a:srgbClr val="000066"/>
+                </a:solidFill>
+              </a:rPr>
+              <a:t>2 </a:t>
+            </a:r>
+            <a:r>
+              <a:rPr lang="en-US" sz="3600" b="1" dirty="0">
+                <a:solidFill>
+                  <a:srgbClr val="000066"/>
+                </a:solidFill>
+              </a:rPr>
+              <a:t>)</a:t>
+            </a:r>
+            <a:endParaRPr lang="vi-VN" sz="3600" b="1" dirty="0">
+              <a:solidFill>
+                <a:srgbClr val="000066"/>
+              </a:solidFill>
+            </a:endParaRPr>
+          </a:p>
+        </p:txBody>
+      </p:sp>
+    </p:spTree>
+    <p:extLst>
+      <p:ext uri="{BB962C8B-B14F-4D97-AF65-F5344CB8AC3E}">
+        <p14:creationId xmlns:p14="http://schemas.microsoft.com/office/powerpoint/2010/main" val="532806434"/>
+      </p:ext>
+    </p:extLst>
+  </p:cSld>
+  <p:clrMapOvr>
+    <a:masterClrMapping/>
+  </p:clrMapOvr>
+</p:sld>
+</file>
+
+<file path=ppt/slides/slide6.xml><?xml version="1.0" encoding="utf-8"?>
+<p:sld xmlns:a="http://schemas.openxmlformats.org/drawingml/2006/main" xmlns:r="http://schemas.openxmlformats.org/officeDocument/2006/relationships" xmlns:p="http://schemas.openxmlformats.org/presentationml/2006/main">
+  <p:cSld>
+    <p:spTree>
+      <p:nvGrpSpPr>
+        <p:cNvPr id="1" name=""/>
+        <p:cNvGrpSpPr/>
+        <p:nvPr/>
+      </p:nvGrpSpPr>
+      <p:grpSpPr>
+        <a:xfrm>
+          <a:off x="0" y="0"/>
+          <a:ext cx="0" cy="0"/>
+          <a:chOff x="0" y="0"/>
+          <a:chExt cx="0" cy="0"/>
+        </a:xfrm>
+      </p:grpSpPr>
+      <p:sp>
+        <p:nvSpPr>
+          <p:cNvPr id="5" name="內容版面配置區 4"/>
+          <p:cNvSpPr>
+            <a:spLocks noGrp="1"/>
+          </p:cNvSpPr>
+          <p:nvPr>
+            <p:ph idx="1"/>
+          </p:nvPr>
+        </p:nvSpPr>
+        <p:spPr>
+          <a:xfrm>
+            <a:off x="0" y="1563638"/>
+            <a:ext cx="9144000" cy="1803647"/>
+          </a:xfrm>
+        </p:spPr>
+        <p:txBody>
+          <a:bodyPr anchor="ctr">
+            <a:normAutofit/>
+          </a:bodyPr>
+          <a:lstStyle/>
+          <a:p>
+            <a:pPr algn="ctr">
+              <a:buNone/>
+            </a:pPr>
             <a:r>
               <a:rPr lang="zh-TW" altLang="en-US" sz="4800" b="1" dirty="0">
                 <a:solidFill>
@@ -3713,7 +3762,297 @@
                 <a:latin typeface="微軟正黑體" pitchFamily="34" charset="-120"/>
                 <a:ea typeface="微軟正黑體" pitchFamily="34" charset="-120"/>
               </a:rPr>
-              <a:t>徒歡聚</a:t>
+              <a:t>如此危險  試煉網羅</a:t>
+            </a:r>
+          </a:p>
+          <a:p>
+            <a:pPr algn="ctr">
+              <a:buNone/>
+            </a:pPr>
+            <a:r>
+              <a:rPr lang="zh-TW" altLang="en-US" sz="4800" b="1" dirty="0">
+                <a:solidFill>
+                  <a:srgbClr val="000066"/>
+                </a:solidFill>
+                <a:latin typeface="微軟正黑體" pitchFamily="34" charset="-120"/>
+                <a:ea typeface="微軟正黑體" pitchFamily="34" charset="-120"/>
+              </a:rPr>
+              <a:t>我已安然經過</a:t>
+            </a:r>
+            <a:endParaRPr lang="zh-TW" altLang="en-US" sz="4800" b="1" dirty="0">
+              <a:solidFill>
+                <a:srgbClr val="000066"/>
+              </a:solidFill>
+              <a:latin typeface="微軟正黑體" pitchFamily="34" charset="-120"/>
+              <a:ea typeface="微軟正黑體" pitchFamily="34" charset="-120"/>
+            </a:endParaRPr>
+          </a:p>
+        </p:txBody>
+      </p:sp>
+      <p:sp>
+        <p:nvSpPr>
+          <p:cNvPr id="3" name="TextBox 2"/>
+          <p:cNvSpPr txBox="1"/>
+          <p:nvPr/>
+        </p:nvSpPr>
+        <p:spPr>
+          <a:xfrm>
+            <a:off x="0" y="3939903"/>
+            <a:ext cx="9144000" cy="646331"/>
+          </a:xfrm>
+          <a:prstGeom prst="rect">
+            <a:avLst/>
+          </a:prstGeom>
+          <a:noFill/>
+        </p:spPr>
+        <p:txBody>
+          <a:bodyPr wrap="square" rtlCol="0">
+            <a:spAutoFit/>
+          </a:bodyPr>
+          <a:lstStyle/>
+          <a:p>
+            <a:pPr algn="ctr"/>
+            <a:r>
+              <a:rPr lang="en-US" sz="3600" b="1" dirty="0">
+                <a:solidFill>
+                  <a:srgbClr val="000066"/>
+                </a:solidFill>
+              </a:rPr>
+              <a:t>( </a:t>
+            </a:r>
+            <a:r>
+              <a:rPr lang="en-US" sz="3600" b="1" dirty="0" smtClean="0">
+                <a:solidFill>
+                  <a:srgbClr val="000066"/>
+                </a:solidFill>
+              </a:rPr>
+              <a:t>3 </a:t>
+            </a:r>
+            <a:r>
+              <a:rPr lang="en-US" sz="3600" b="1" dirty="0">
+                <a:solidFill>
+                  <a:srgbClr val="000066"/>
+                </a:solidFill>
+              </a:rPr>
+              <a:t>)</a:t>
+            </a:r>
+            <a:endParaRPr lang="vi-VN" sz="3600" b="1" dirty="0">
+              <a:solidFill>
+                <a:srgbClr val="000066"/>
+              </a:solidFill>
+            </a:endParaRPr>
+          </a:p>
+        </p:txBody>
+      </p:sp>
+    </p:spTree>
+    <p:extLst>
+      <p:ext uri="{BB962C8B-B14F-4D97-AF65-F5344CB8AC3E}">
+        <p14:creationId xmlns:p14="http://schemas.microsoft.com/office/powerpoint/2010/main" val="3350298781"/>
+      </p:ext>
+    </p:extLst>
+  </p:cSld>
+  <p:clrMapOvr>
+    <a:masterClrMapping/>
+  </p:clrMapOvr>
+</p:sld>
+</file>
+
+<file path=ppt/slides/slide7.xml><?xml version="1.0" encoding="utf-8"?>
+<p:sld xmlns:a="http://schemas.openxmlformats.org/drawingml/2006/main" xmlns:r="http://schemas.openxmlformats.org/officeDocument/2006/relationships" xmlns:p="http://schemas.openxmlformats.org/presentationml/2006/main">
+  <p:cSld>
+    <p:spTree>
+      <p:nvGrpSpPr>
+        <p:cNvPr id="1" name=""/>
+        <p:cNvGrpSpPr/>
+        <p:nvPr/>
+      </p:nvGrpSpPr>
+      <p:grpSpPr>
+        <a:xfrm>
+          <a:off x="0" y="0"/>
+          <a:ext cx="0" cy="0"/>
+          <a:chOff x="0" y="0"/>
+          <a:chExt cx="0" cy="0"/>
+        </a:xfrm>
+      </p:grpSpPr>
+      <p:sp>
+        <p:nvSpPr>
+          <p:cNvPr id="5" name="內容版面配置區 4"/>
+          <p:cNvSpPr>
+            <a:spLocks noGrp="1"/>
+          </p:cNvSpPr>
+          <p:nvPr>
+            <p:ph idx="1"/>
+          </p:nvPr>
+        </p:nvSpPr>
+        <p:spPr>
+          <a:xfrm>
+            <a:off x="0" y="1563638"/>
+            <a:ext cx="9144000" cy="1803647"/>
+          </a:xfrm>
+        </p:spPr>
+        <p:txBody>
+          <a:bodyPr anchor="ctr">
+            <a:normAutofit/>
+          </a:bodyPr>
+          <a:lstStyle/>
+          <a:p>
+            <a:pPr algn="ctr">
+              <a:buNone/>
+            </a:pPr>
+            <a:r>
+              <a:rPr lang="zh-TW" altLang="en-US" sz="4800" b="1" dirty="0">
+                <a:solidFill>
+                  <a:srgbClr val="000066"/>
+                </a:solidFill>
+                <a:latin typeface="微軟正黑體" pitchFamily="34" charset="-120"/>
+                <a:ea typeface="微軟正黑體" pitchFamily="34" charset="-120"/>
+              </a:rPr>
+              <a:t>靠主恩典  安全不怕</a:t>
+            </a:r>
+          </a:p>
+          <a:p>
+            <a:pPr algn="ctr">
+              <a:buNone/>
+            </a:pPr>
+            <a:r>
+              <a:rPr lang="zh-TW" altLang="en-US" sz="4800" b="1" dirty="0">
+                <a:solidFill>
+                  <a:srgbClr val="000066"/>
+                </a:solidFill>
+                <a:latin typeface="微軟正黑體" pitchFamily="34" charset="-120"/>
+                <a:ea typeface="微軟正黑體" pitchFamily="34" charset="-120"/>
+              </a:rPr>
+              <a:t>更引導我歸家</a:t>
+            </a:r>
+            <a:endParaRPr lang="zh-TW" altLang="en-US" sz="4800" b="1" dirty="0">
+              <a:solidFill>
+                <a:srgbClr val="000066"/>
+              </a:solidFill>
+              <a:latin typeface="微軟正黑體" pitchFamily="34" charset="-120"/>
+              <a:ea typeface="微軟正黑體" pitchFamily="34" charset="-120"/>
+            </a:endParaRPr>
+          </a:p>
+        </p:txBody>
+      </p:sp>
+      <p:sp>
+        <p:nvSpPr>
+          <p:cNvPr id="3" name="TextBox 2"/>
+          <p:cNvSpPr txBox="1"/>
+          <p:nvPr/>
+        </p:nvSpPr>
+        <p:spPr>
+          <a:xfrm>
+            <a:off x="0" y="3939903"/>
+            <a:ext cx="9144000" cy="646331"/>
+          </a:xfrm>
+          <a:prstGeom prst="rect">
+            <a:avLst/>
+          </a:prstGeom>
+          <a:noFill/>
+        </p:spPr>
+        <p:txBody>
+          <a:bodyPr wrap="square" rtlCol="0">
+            <a:spAutoFit/>
+          </a:bodyPr>
+          <a:lstStyle/>
+          <a:p>
+            <a:pPr algn="ctr"/>
+            <a:r>
+              <a:rPr lang="en-US" sz="3600" b="1" dirty="0">
+                <a:solidFill>
+                  <a:srgbClr val="000066"/>
+                </a:solidFill>
+              </a:rPr>
+              <a:t>( </a:t>
+            </a:r>
+            <a:r>
+              <a:rPr lang="en-US" sz="3600" b="1" dirty="0" smtClean="0">
+                <a:solidFill>
+                  <a:srgbClr val="000066"/>
+                </a:solidFill>
+              </a:rPr>
+              <a:t>3 </a:t>
+            </a:r>
+            <a:r>
+              <a:rPr lang="en-US" sz="3600" b="1" dirty="0">
+                <a:solidFill>
+                  <a:srgbClr val="000066"/>
+                </a:solidFill>
+              </a:rPr>
+              <a:t>)</a:t>
+            </a:r>
+            <a:endParaRPr lang="vi-VN" sz="3600" b="1" dirty="0">
+              <a:solidFill>
+                <a:srgbClr val="000066"/>
+              </a:solidFill>
+            </a:endParaRPr>
+          </a:p>
+        </p:txBody>
+      </p:sp>
+    </p:spTree>
+    <p:extLst>
+      <p:ext uri="{BB962C8B-B14F-4D97-AF65-F5344CB8AC3E}">
+        <p14:creationId xmlns:p14="http://schemas.microsoft.com/office/powerpoint/2010/main" val="3002168758"/>
+      </p:ext>
+    </p:extLst>
+  </p:cSld>
+  <p:clrMapOvr>
+    <a:masterClrMapping/>
+  </p:clrMapOvr>
+</p:sld>
+</file>
+
+<file path=ppt/slides/slide8.xml><?xml version="1.0" encoding="utf-8"?>
+<p:sld xmlns:a="http://schemas.openxmlformats.org/drawingml/2006/main" xmlns:r="http://schemas.openxmlformats.org/officeDocument/2006/relationships" xmlns:p="http://schemas.openxmlformats.org/presentationml/2006/main">
+  <p:cSld>
+    <p:spTree>
+      <p:nvGrpSpPr>
+        <p:cNvPr id="1" name=""/>
+        <p:cNvGrpSpPr/>
+        <p:nvPr/>
+      </p:nvGrpSpPr>
+      <p:grpSpPr>
+        <a:xfrm>
+          <a:off x="0" y="0"/>
+          <a:ext cx="0" cy="0"/>
+          <a:chOff x="0" y="0"/>
+          <a:chExt cx="0" cy="0"/>
+        </a:xfrm>
+      </p:grpSpPr>
+      <p:sp>
+        <p:nvSpPr>
+          <p:cNvPr id="5" name="內容版面配置區 4"/>
+          <p:cNvSpPr>
+            <a:spLocks noGrp="1"/>
+          </p:cNvSpPr>
+          <p:nvPr>
+            <p:ph idx="1"/>
+          </p:nvPr>
+        </p:nvSpPr>
+        <p:spPr>
+          <a:xfrm>
+            <a:off x="0" y="1563638"/>
+            <a:ext cx="9144000" cy="1803647"/>
+          </a:xfrm>
+        </p:spPr>
+        <p:txBody>
+          <a:bodyPr anchor="ctr">
+            <a:normAutofit/>
+          </a:bodyPr>
+          <a:lstStyle/>
+          <a:p>
+            <a:pPr algn="ctr">
+              <a:buNone/>
+            </a:pPr>
+            <a:r>
+              <a:rPr lang="zh-TW" altLang="en-US" sz="4800" b="1" dirty="0">
+                <a:solidFill>
+                  <a:srgbClr val="000066"/>
+                </a:solidFill>
+                <a:latin typeface="微軟正黑體" pitchFamily="34" charset="-120"/>
+                <a:ea typeface="微軟正黑體" pitchFamily="34" charset="-120"/>
+              </a:rPr>
+              <a:t>將來禧年  聖徒歡聚</a:t>
             </a:r>
           </a:p>
           <a:p>
@@ -3730,7 +4069,122 @@
               </a:rPr>
               <a:t>恩光愛誼千年</a:t>
             </a:r>
-          </a:p>
+            <a:endParaRPr lang="zh-TW" altLang="en-US" sz="4800" b="1" dirty="0">
+              <a:solidFill>
+                <a:srgbClr val="000066"/>
+              </a:solidFill>
+              <a:latin typeface="微軟正黑體" pitchFamily="34" charset="-120"/>
+              <a:ea typeface="微軟正黑體" pitchFamily="34" charset="-120"/>
+            </a:endParaRPr>
+          </a:p>
+        </p:txBody>
+      </p:sp>
+      <p:sp>
+        <p:nvSpPr>
+          <p:cNvPr id="3" name="TextBox 2"/>
+          <p:cNvSpPr txBox="1"/>
+          <p:nvPr/>
+        </p:nvSpPr>
+        <p:spPr>
+          <a:xfrm>
+            <a:off x="0" y="3939903"/>
+            <a:ext cx="9144000" cy="646331"/>
+          </a:xfrm>
+          <a:prstGeom prst="rect">
+            <a:avLst/>
+          </a:prstGeom>
+          <a:noFill/>
+        </p:spPr>
+        <p:txBody>
+          <a:bodyPr wrap="square" rtlCol="0">
+            <a:spAutoFit/>
+          </a:bodyPr>
+          <a:lstStyle/>
+          <a:p>
+            <a:pPr algn="ctr"/>
+            <a:r>
+              <a:rPr lang="en-US" sz="3600" b="1" dirty="0">
+                <a:solidFill>
+                  <a:srgbClr val="000066"/>
+                </a:solidFill>
+              </a:rPr>
+              <a:t>( </a:t>
+            </a:r>
+            <a:r>
+              <a:rPr lang="en-US" sz="3600" b="1" dirty="0" smtClean="0">
+                <a:solidFill>
+                  <a:srgbClr val="000066"/>
+                </a:solidFill>
+              </a:rPr>
+              <a:t>4 </a:t>
+            </a:r>
+            <a:r>
+              <a:rPr lang="en-US" sz="3600" b="1" dirty="0">
+                <a:solidFill>
+                  <a:srgbClr val="000066"/>
+                </a:solidFill>
+              </a:rPr>
+              <a:t>)</a:t>
+            </a:r>
+            <a:endParaRPr lang="vi-VN" sz="3600" b="1" dirty="0">
+              <a:solidFill>
+                <a:srgbClr val="000066"/>
+              </a:solidFill>
+            </a:endParaRPr>
+          </a:p>
+        </p:txBody>
+      </p:sp>
+    </p:spTree>
+    <p:extLst>
+      <p:ext uri="{BB962C8B-B14F-4D97-AF65-F5344CB8AC3E}">
+        <p14:creationId xmlns:p14="http://schemas.microsoft.com/office/powerpoint/2010/main" val="3953593073"/>
+      </p:ext>
+    </p:extLst>
+  </p:cSld>
+  <p:clrMapOvr>
+    <a:masterClrMapping/>
+  </p:clrMapOvr>
+</p:sld>
+</file>
+
+<file path=ppt/slides/slide9.xml><?xml version="1.0" encoding="utf-8"?>
+<p:sld xmlns:a="http://schemas.openxmlformats.org/drawingml/2006/main" xmlns:r="http://schemas.openxmlformats.org/officeDocument/2006/relationships" xmlns:p="http://schemas.openxmlformats.org/presentationml/2006/main">
+  <p:cSld>
+    <p:spTree>
+      <p:nvGrpSpPr>
+        <p:cNvPr id="1" name=""/>
+        <p:cNvGrpSpPr/>
+        <p:nvPr/>
+      </p:nvGrpSpPr>
+      <p:grpSpPr>
+        <a:xfrm>
+          <a:off x="0" y="0"/>
+          <a:ext cx="0" cy="0"/>
+          <a:chOff x="0" y="0"/>
+          <a:chExt cx="0" cy="0"/>
+        </a:xfrm>
+      </p:grpSpPr>
+      <p:sp>
+        <p:nvSpPr>
+          <p:cNvPr id="5" name="內容版面配置區 4"/>
+          <p:cNvSpPr>
+            <a:spLocks noGrp="1"/>
+          </p:cNvSpPr>
+          <p:nvPr>
+            <p:ph idx="1"/>
+          </p:nvPr>
+        </p:nvSpPr>
+        <p:spPr>
+          <a:xfrm>
+            <a:off x="0" y="1563638"/>
+            <a:ext cx="9144000" cy="1803647"/>
+          </a:xfrm>
+        </p:spPr>
+        <p:txBody>
+          <a:bodyPr anchor="ctr">
+            <a:normAutofit/>
+          </a:bodyPr>
+          <a:lstStyle/>
           <a:p>
             <a:pPr algn="ctr">
               <a:buNone/>
@@ -3743,27 +4197,7 @@
                 <a:latin typeface="微軟正黑體" pitchFamily="34" charset="-120"/>
                 <a:ea typeface="微軟正黑體" pitchFamily="34" charset="-120"/>
               </a:rPr>
-              <a:t>喜樂頌讚 </a:t>
-            </a:r>
-            <a:r>
-              <a:rPr lang="zh-TW" altLang="en-US" sz="4800" b="1" dirty="0">
-                <a:solidFill>
-                  <a:srgbClr val="000066"/>
-                </a:solidFill>
-                <a:latin typeface="微軟正黑體" pitchFamily="34" charset="-120"/>
-                <a:ea typeface="微軟正黑體" pitchFamily="34" charset="-120"/>
-              </a:rPr>
-              <a:t> 在</a:t>
-            </a:r>
-            <a:r>
-              <a:rPr lang="zh-TW" altLang="en-US" sz="4800" b="1" dirty="0">
-                <a:solidFill>
-                  <a:srgbClr val="000066"/>
-                </a:solidFill>
-                <a:latin typeface="微軟正黑體" pitchFamily="34" charset="-120"/>
-                <a:ea typeface="微軟正黑體" pitchFamily="34" charset="-120"/>
-              </a:rPr>
-              <a:t>父座前</a:t>
+              <a:t>喜樂頌讚  在父座前</a:t>
             </a:r>
           </a:p>
           <a:p>
@@ -3780,10 +4214,77 @@
               </a:rPr>
               <a:t>深望那日快現</a:t>
             </a:r>
+            <a:endParaRPr lang="zh-TW" altLang="en-US" sz="4800" b="1" dirty="0">
+              <a:solidFill>
+                <a:srgbClr val="000066"/>
+              </a:solidFill>
+              <a:latin typeface="微軟正黑體" pitchFamily="34" charset="-120"/>
+              <a:ea typeface="微軟正黑體" pitchFamily="34" charset="-120"/>
+            </a:endParaRPr>
+          </a:p>
+        </p:txBody>
+      </p:sp>
+      <p:sp>
+        <p:nvSpPr>
+          <p:cNvPr id="3" name="TextBox 2"/>
+          <p:cNvSpPr txBox="1"/>
+          <p:nvPr/>
+        </p:nvSpPr>
+        <p:spPr>
+          <a:xfrm>
+            <a:off x="0" y="3939903"/>
+            <a:ext cx="9144000" cy="646331"/>
+          </a:xfrm>
+          <a:prstGeom prst="rect">
+            <a:avLst/>
+          </a:prstGeom>
+          <a:noFill/>
+        </p:spPr>
+        <p:txBody>
+          <a:bodyPr wrap="square" rtlCol="0">
+            <a:spAutoFit/>
+          </a:bodyPr>
+          <a:lstStyle/>
+          <a:p>
+            <a:pPr algn="ctr"/>
+            <a:r>
+              <a:rPr lang="en-US" sz="3600" b="1" dirty="0">
+                <a:solidFill>
+                  <a:srgbClr val="000066"/>
+                </a:solidFill>
+              </a:rPr>
+              <a:t>( </a:t>
+            </a:r>
+            <a:r>
+              <a:rPr lang="en-US" sz="3600" b="1" dirty="0" smtClean="0">
+                <a:solidFill>
+                  <a:srgbClr val="000066"/>
+                </a:solidFill>
+              </a:rPr>
+              <a:t>4 </a:t>
+            </a:r>
+            <a:r>
+              <a:rPr lang="en-US" sz="3600" b="1" dirty="0">
+                <a:solidFill>
+                  <a:srgbClr val="000066"/>
+                </a:solidFill>
+              </a:rPr>
+              <a:t>)</a:t>
+            </a:r>
+            <a:endParaRPr lang="vi-VN" sz="3600" b="1" dirty="0">
+              <a:solidFill>
+                <a:srgbClr val="000066"/>
+              </a:solidFill>
+            </a:endParaRPr>
           </a:p>
         </p:txBody>
       </p:sp>
     </p:spTree>
+    <p:extLst>
+      <p:ext uri="{BB962C8B-B14F-4D97-AF65-F5344CB8AC3E}">
+        <p14:creationId xmlns:p14="http://schemas.microsoft.com/office/powerpoint/2010/main" val="2849429529"/>
+      </p:ext>
+    </p:extLst>
   </p:cSld>
   <p:clrMapOvr>
     <a:masterClrMapping/>

</xml_diff>